<commit_message>
Memory-Cores - TLB update
- tlb_v timing
- docs
</commit_message>
<xml_diff>
--- a/tlb/doc/TLB.pptx
+++ b/tlb/doc/TLB.pptx
@@ -6,6 +6,7 @@
   </p:sldMasterIdLst>
   <p:sldIdLst>
     <p:sldId id="256" r:id="rId2"/>
+    <p:sldId id="257" r:id="rId3"/>
   </p:sldIdLst>
   <p:sldSz cx="12192000" cy="6858000"/>
   <p:notesSz cx="6858000" cy="9144000"/>
@@ -104,7 +105,145 @@
       </a:defRPr>
     </a:lvl9pPr>
   </p:defaultTextStyle>
+  <p:extLst>
+    <p:ext uri="{EFAFB233-063F-42B5-8137-9DF3F51BA10A}">
+      <p15:sldGuideLst xmlns:p15="http://schemas.microsoft.com/office/powerpoint/2012/main"/>
+    </p:ext>
+  </p:extLst>
 </p:presentation>
+</file>
+
+<file path=ppt/revisionInfo.xml><?xml version="1.0" encoding="utf-8"?>
+<p1510:revInfo xmlns:a="http://schemas.openxmlformats.org/drawingml/2006/main" xmlns:r="http://schemas.openxmlformats.org/officeDocument/2006/relationships" xmlns:p1510="http://schemas.microsoft.com/office/powerpoint/2015/10/main">
+  <p1510:revLst>
+    <p1510:client id="{A6943510-F7A2-417E-8ACC-7501B38A9E58}" v="3" dt="2026-02-08T14:45:43.838"/>
+  </p1510:revLst>
+</p1510:revInfo>
+</file>
+
+<file path=ppt/changesInfos/changesInfo1.xml><?xml version="1.0" encoding="utf-8"?>
+<pc:chgInfo xmlns:a="http://schemas.openxmlformats.org/drawingml/2006/main" xmlns:r="http://schemas.openxmlformats.org/officeDocument/2006/relationships" xmlns:ac="http://schemas.microsoft.com/office/drawing/2013/main/command" xmlns:pc="http://schemas.microsoft.com/office/powerpoint/2013/main/command">
+  <pc:docChgLst>
+    <pc:chgData name="Robert Finch" userId="360118edfabb5ba6" providerId="LiveId" clId="{940D50E2-FEDC-434C-83CF-A13052851249}"/>
+    <pc:docChg chg="custSel addSld modSld">
+      <pc:chgData name="Robert Finch" userId="360118edfabb5ba6" providerId="LiveId" clId="{940D50E2-FEDC-434C-83CF-A13052851249}" dt="2026-02-08T14:46:40.056" v="111" actId="692"/>
+      <pc:docMkLst>
+        <pc:docMk/>
+      </pc:docMkLst>
+      <pc:sldChg chg="addSp delSp modSp new mod">
+        <pc:chgData name="Robert Finch" userId="360118edfabb5ba6" providerId="LiveId" clId="{940D50E2-FEDC-434C-83CF-A13052851249}" dt="2026-02-08T14:46:40.056" v="111" actId="692"/>
+        <pc:sldMkLst>
+          <pc:docMk/>
+          <pc:sldMk cId="298200720" sldId="257"/>
+        </pc:sldMkLst>
+        <pc:spChg chg="mod">
+          <ac:chgData name="Robert Finch" userId="360118edfabb5ba6" providerId="LiveId" clId="{940D50E2-FEDC-434C-83CF-A13052851249}" dt="2026-02-08T14:40:24.266" v="14" actId="1076"/>
+          <ac:spMkLst>
+            <pc:docMk/>
+            <pc:sldMk cId="298200720" sldId="257"/>
+            <ac:spMk id="2" creationId="{8AD24ED4-97D6-ECD1-CF1E-48BE8FE8F6AD}"/>
+          </ac:spMkLst>
+        </pc:spChg>
+        <pc:spChg chg="del">
+          <ac:chgData name="Robert Finch" userId="360118edfabb5ba6" providerId="LiveId" clId="{940D50E2-FEDC-434C-83CF-A13052851249}" dt="2026-02-08T14:40:05.775" v="1" actId="478"/>
+          <ac:spMkLst>
+            <pc:docMk/>
+            <pc:sldMk cId="298200720" sldId="257"/>
+            <ac:spMk id="3" creationId="{B2D31572-A14B-6C25-2ADE-C983D83A6A52}"/>
+          </ac:spMkLst>
+        </pc:spChg>
+        <pc:spChg chg="add mod">
+          <ac:chgData name="Robert Finch" userId="360118edfabb5ba6" providerId="LiveId" clId="{940D50E2-FEDC-434C-83CF-A13052851249}" dt="2026-02-08T14:43:18.777" v="22" actId="692"/>
+          <ac:spMkLst>
+            <pc:docMk/>
+            <pc:sldMk cId="298200720" sldId="257"/>
+            <ac:spMk id="8" creationId="{1ADAA06D-F955-C588-9A7E-6824651886C5}"/>
+          </ac:spMkLst>
+        </pc:spChg>
+        <pc:spChg chg="add mod">
+          <ac:chgData name="Robert Finch" userId="360118edfabb5ba6" providerId="LiveId" clId="{940D50E2-FEDC-434C-83CF-A13052851249}" dt="2026-02-08T14:43:53.760" v="40" actId="1076"/>
+          <ac:spMkLst>
+            <pc:docMk/>
+            <pc:sldMk cId="298200720" sldId="257"/>
+            <ac:spMk id="9" creationId="{90A50066-2ECB-EBC7-4265-AADD66E82B68}"/>
+          </ac:spMkLst>
+        </pc:spChg>
+        <pc:spChg chg="add mod">
+          <ac:chgData name="Robert Finch" userId="360118edfabb5ba6" providerId="LiveId" clId="{940D50E2-FEDC-434C-83CF-A13052851249}" dt="2026-02-08T14:44:56.668" v="80" actId="14100"/>
+          <ac:spMkLst>
+            <pc:docMk/>
+            <pc:sldMk cId="298200720" sldId="257"/>
+            <ac:spMk id="10" creationId="{BECE88CC-B0A4-989C-DCA8-86804E3EE0EF}"/>
+          </ac:spMkLst>
+        </pc:spChg>
+        <pc:spChg chg="add mod">
+          <ac:chgData name="Robert Finch" userId="360118edfabb5ba6" providerId="LiveId" clId="{940D50E2-FEDC-434C-83CF-A13052851249}" dt="2026-02-08T14:44:43.930" v="79" actId="1076"/>
+          <ac:spMkLst>
+            <pc:docMk/>
+            <pc:sldMk cId="298200720" sldId="257"/>
+            <ac:spMk id="11" creationId="{B0394704-215A-78C5-839C-98D97B7B64CC}"/>
+          </ac:spMkLst>
+        </pc:spChg>
+        <pc:spChg chg="add mod">
+          <ac:chgData name="Robert Finch" userId="360118edfabb5ba6" providerId="LiveId" clId="{940D50E2-FEDC-434C-83CF-A13052851249}" dt="2026-02-08T14:45:27.444" v="86" actId="14100"/>
+          <ac:spMkLst>
+            <pc:docMk/>
+            <pc:sldMk cId="298200720" sldId="257"/>
+            <ac:spMk id="12" creationId="{90962FC6-A9AC-7BC3-995F-DC8FC38DC85F}"/>
+          </ac:spMkLst>
+        </pc:spChg>
+        <pc:spChg chg="add mod">
+          <ac:chgData name="Robert Finch" userId="360118edfabb5ba6" providerId="LiveId" clId="{940D50E2-FEDC-434C-83CF-A13052851249}" dt="2026-02-08T14:46:01.099" v="105" actId="20577"/>
+          <ac:spMkLst>
+            <pc:docMk/>
+            <pc:sldMk cId="298200720" sldId="257"/>
+            <ac:spMk id="13" creationId="{FB2B7443-0E73-A06E-8A5F-4CF464108D37}"/>
+          </ac:spMkLst>
+        </pc:spChg>
+        <pc:picChg chg="add del mod">
+          <ac:chgData name="Robert Finch" userId="360118edfabb5ba6" providerId="LiveId" clId="{940D50E2-FEDC-434C-83CF-A13052851249}" dt="2026-02-08T14:42:19.018" v="17" actId="478"/>
+          <ac:picMkLst>
+            <pc:docMk/>
+            <pc:sldMk cId="298200720" sldId="257"/>
+            <ac:picMk id="5" creationId="{0E4A8E3D-149D-ED33-4F49-AF9F37C4C6BD}"/>
+          </ac:picMkLst>
+        </pc:picChg>
+        <pc:picChg chg="add mod">
+          <ac:chgData name="Robert Finch" userId="360118edfabb5ba6" providerId="LiveId" clId="{940D50E2-FEDC-434C-83CF-A13052851249}" dt="2026-02-08T14:42:24.954" v="18" actId="1076"/>
+          <ac:picMkLst>
+            <pc:docMk/>
+            <pc:sldMk cId="298200720" sldId="257"/>
+            <ac:picMk id="7" creationId="{2FFBAB9C-47B2-5B53-F5CE-0E060218BDF8}"/>
+          </ac:picMkLst>
+        </pc:picChg>
+        <pc:cxnChg chg="add mod">
+          <ac:chgData name="Robert Finch" userId="360118edfabb5ba6" providerId="LiveId" clId="{940D50E2-FEDC-434C-83CF-A13052851249}" dt="2026-02-08T14:46:13.646" v="107" actId="692"/>
+          <ac:cxnSpMkLst>
+            <pc:docMk/>
+            <pc:sldMk cId="298200720" sldId="257"/>
+            <ac:cxnSpMk id="15" creationId="{41FD806B-9409-064A-4754-64A0B1A89AF7}"/>
+          </ac:cxnSpMkLst>
+        </pc:cxnChg>
+        <pc:cxnChg chg="add mod">
+          <ac:chgData name="Robert Finch" userId="360118edfabb5ba6" providerId="LiveId" clId="{940D50E2-FEDC-434C-83CF-A13052851249}" dt="2026-02-08T14:46:26.321" v="109" actId="692"/>
+          <ac:cxnSpMkLst>
+            <pc:docMk/>
+            <pc:sldMk cId="298200720" sldId="257"/>
+            <ac:cxnSpMk id="17" creationId="{B2AA58E9-BB43-E682-C195-65974ABB04AF}"/>
+          </ac:cxnSpMkLst>
+        </pc:cxnChg>
+        <pc:cxnChg chg="add mod">
+          <ac:chgData name="Robert Finch" userId="360118edfabb5ba6" providerId="LiveId" clId="{940D50E2-FEDC-434C-83CF-A13052851249}" dt="2026-02-08T14:46:40.056" v="111" actId="692"/>
+          <ac:cxnSpMkLst>
+            <pc:docMk/>
+            <pc:sldMk cId="298200720" sldId="257"/>
+            <ac:cxnSpMk id="19" creationId="{465ED996-9679-8242-E0DF-773D201A6ACE}"/>
+          </ac:cxnSpMkLst>
+        </pc:cxnChg>
+      </pc:sldChg>
+    </pc:docChg>
+  </pc:docChgLst>
+</pc:chgInfo>
 </file>
 
 <file path=ppt/slideLayouts/slideLayout1.xml><?xml version="1.0" encoding="utf-8"?>
@@ -256,7 +395,7 @@
           <a:p>
             <a:fld id="{4C6942FD-6653-4B7A-B048-CA069CAF0246}" type="datetimeFigureOut">
               <a:rPr lang="en-CA" smtClean="0"/>
-              <a:t>2026-02-07</a:t>
+              <a:t>2026-02-08</a:t>
             </a:fld>
             <a:endParaRPr lang="en-CA"/>
           </a:p>
@@ -456,7 +595,7 @@
           <a:p>
             <a:fld id="{4C6942FD-6653-4B7A-B048-CA069CAF0246}" type="datetimeFigureOut">
               <a:rPr lang="en-CA" smtClean="0"/>
-              <a:t>2026-02-07</a:t>
+              <a:t>2026-02-08</a:t>
             </a:fld>
             <a:endParaRPr lang="en-CA"/>
           </a:p>
@@ -666,7 +805,7 @@
           <a:p>
             <a:fld id="{4C6942FD-6653-4B7A-B048-CA069CAF0246}" type="datetimeFigureOut">
               <a:rPr lang="en-CA" smtClean="0"/>
-              <a:t>2026-02-07</a:t>
+              <a:t>2026-02-08</a:t>
             </a:fld>
             <a:endParaRPr lang="en-CA"/>
           </a:p>
@@ -866,7 +1005,7 @@
           <a:p>
             <a:fld id="{4C6942FD-6653-4B7A-B048-CA069CAF0246}" type="datetimeFigureOut">
               <a:rPr lang="en-CA" smtClean="0"/>
-              <a:t>2026-02-07</a:t>
+              <a:t>2026-02-08</a:t>
             </a:fld>
             <a:endParaRPr lang="en-CA"/>
           </a:p>
@@ -1142,7 +1281,7 @@
           <a:p>
             <a:fld id="{4C6942FD-6653-4B7A-B048-CA069CAF0246}" type="datetimeFigureOut">
               <a:rPr lang="en-CA" smtClean="0"/>
-              <a:t>2026-02-07</a:t>
+              <a:t>2026-02-08</a:t>
             </a:fld>
             <a:endParaRPr lang="en-CA"/>
           </a:p>
@@ -1410,7 +1549,7 @@
           <a:p>
             <a:fld id="{4C6942FD-6653-4B7A-B048-CA069CAF0246}" type="datetimeFigureOut">
               <a:rPr lang="en-CA" smtClean="0"/>
-              <a:t>2026-02-07</a:t>
+              <a:t>2026-02-08</a:t>
             </a:fld>
             <a:endParaRPr lang="en-CA"/>
           </a:p>
@@ -1825,7 +1964,7 @@
           <a:p>
             <a:fld id="{4C6942FD-6653-4B7A-B048-CA069CAF0246}" type="datetimeFigureOut">
               <a:rPr lang="en-CA" smtClean="0"/>
-              <a:t>2026-02-07</a:t>
+              <a:t>2026-02-08</a:t>
             </a:fld>
             <a:endParaRPr lang="en-CA"/>
           </a:p>
@@ -1967,7 +2106,7 @@
           <a:p>
             <a:fld id="{4C6942FD-6653-4B7A-B048-CA069CAF0246}" type="datetimeFigureOut">
               <a:rPr lang="en-CA" smtClean="0"/>
-              <a:t>2026-02-07</a:t>
+              <a:t>2026-02-08</a:t>
             </a:fld>
             <a:endParaRPr lang="en-CA"/>
           </a:p>
@@ -2080,7 +2219,7 @@
           <a:p>
             <a:fld id="{4C6942FD-6653-4B7A-B048-CA069CAF0246}" type="datetimeFigureOut">
               <a:rPr lang="en-CA" smtClean="0"/>
-              <a:t>2026-02-07</a:t>
+              <a:t>2026-02-08</a:t>
             </a:fld>
             <a:endParaRPr lang="en-CA"/>
           </a:p>
@@ -2393,7 +2532,7 @@
           <a:p>
             <a:fld id="{4C6942FD-6653-4B7A-B048-CA069CAF0246}" type="datetimeFigureOut">
               <a:rPr lang="en-CA" smtClean="0"/>
-              <a:t>2026-02-07</a:t>
+              <a:t>2026-02-08</a:t>
             </a:fld>
             <a:endParaRPr lang="en-CA"/>
           </a:p>
@@ -2682,7 +2821,7 @@
           <a:p>
             <a:fld id="{4C6942FD-6653-4B7A-B048-CA069CAF0246}" type="datetimeFigureOut">
               <a:rPr lang="en-CA" smtClean="0"/>
-              <a:t>2026-02-07</a:t>
+              <a:t>2026-02-08</a:t>
             </a:fld>
             <a:endParaRPr lang="en-CA"/>
           </a:p>
@@ -2925,7 +3064,7 @@
           <a:p>
             <a:fld id="{4C6942FD-6653-4B7A-B048-CA069CAF0246}" type="datetimeFigureOut">
               <a:rPr lang="en-CA" smtClean="0"/>
-              <a:t>2026-02-07</a:t>
+              <a:t>2026-02-08</a:t>
             </a:fld>
             <a:endParaRPr lang="en-CA"/>
           </a:p>
@@ -3500,6 +3639,492 @@
     <p:extLst>
       <p:ext uri="{BB962C8B-B14F-4D97-AF65-F5344CB8AC3E}">
         <p14:creationId xmlns:p14="http://schemas.microsoft.com/office/powerpoint/2010/main" val="3966024849"/>
+      </p:ext>
+    </p:extLst>
+  </p:cSld>
+  <p:clrMapOvr>
+    <a:masterClrMapping/>
+  </p:clrMapOvr>
+</p:sld>
+</file>
+
+<file path=ppt/slides/slide2.xml><?xml version="1.0" encoding="utf-8"?>
+<p:sld xmlns:a="http://schemas.openxmlformats.org/drawingml/2006/main" xmlns:r="http://schemas.openxmlformats.org/officeDocument/2006/relationships" xmlns:p="http://schemas.openxmlformats.org/presentationml/2006/main">
+  <p:cSld>
+    <p:spTree>
+      <p:nvGrpSpPr>
+        <p:cNvPr id="1" name=""/>
+        <p:cNvGrpSpPr/>
+        <p:nvPr/>
+      </p:nvGrpSpPr>
+      <p:grpSpPr>
+        <a:xfrm>
+          <a:off x="0" y="0"/>
+          <a:ext cx="0" cy="0"/>
+          <a:chOff x="0" y="0"/>
+          <a:chExt cx="0" cy="0"/>
+        </a:xfrm>
+      </p:grpSpPr>
+      <p:sp>
+        <p:nvSpPr>
+          <p:cNvPr id="2" name="Title 1">
+            <a:extLst>
+              <a:ext uri="{FF2B5EF4-FFF2-40B4-BE49-F238E27FC236}">
+                <a16:creationId xmlns:a16="http://schemas.microsoft.com/office/drawing/2014/main" id="{8AD24ED4-97D6-ECD1-CF1E-48BE8FE8F6AD}"/>
+              </a:ext>
+            </a:extLst>
+          </p:cNvPr>
+          <p:cNvSpPr>
+            <a:spLocks noGrp="1"/>
+          </p:cNvSpPr>
+          <p:nvPr>
+            <p:ph type="title"/>
+          </p:nvPr>
+        </p:nvSpPr>
+        <p:spPr>
+          <a:xfrm>
+            <a:off x="0" y="0"/>
+            <a:ext cx="10515600" cy="1325563"/>
+          </a:xfrm>
+        </p:spPr>
+        <p:txBody>
+          <a:bodyPr/>
+          <a:lstStyle/>
+          <a:p>
+            <a:r>
+              <a:rPr lang="en-US" dirty="0"/>
+              <a:t>Miss Timing</a:t>
+            </a:r>
+            <a:endParaRPr lang="en-CA" dirty="0"/>
+          </a:p>
+        </p:txBody>
+      </p:sp>
+      <p:pic>
+        <p:nvPicPr>
+          <p:cNvPr id="7" name="Picture 6">
+            <a:extLst>
+              <a:ext uri="{FF2B5EF4-FFF2-40B4-BE49-F238E27FC236}">
+                <a16:creationId xmlns:a16="http://schemas.microsoft.com/office/drawing/2014/main" id="{2FFBAB9C-47B2-5B53-F5CE-0E060218BDF8}"/>
+              </a:ext>
+            </a:extLst>
+          </p:cNvPr>
+          <p:cNvPicPr>
+            <a:picLocks noChangeAspect="1"/>
+          </p:cNvPicPr>
+          <p:nvPr/>
+        </p:nvPicPr>
+        <p:blipFill>
+          <a:blip r:embed="rId2"/>
+          <a:stretch>
+            <a:fillRect/>
+          </a:stretch>
+        </p:blipFill>
+        <p:spPr>
+          <a:xfrm>
+            <a:off x="0" y="955754"/>
+            <a:ext cx="12192000" cy="3528508"/>
+          </a:xfrm>
+          <a:prstGeom prst="rect">
+            <a:avLst/>
+          </a:prstGeom>
+        </p:spPr>
+      </p:pic>
+      <p:sp>
+        <p:nvSpPr>
+          <p:cNvPr id="8" name="Oval 7">
+            <a:extLst>
+              <a:ext uri="{FF2B5EF4-FFF2-40B4-BE49-F238E27FC236}">
+                <a16:creationId xmlns:a16="http://schemas.microsoft.com/office/drawing/2014/main" id="{1ADAA06D-F955-C588-9A7E-6824651886C5}"/>
+              </a:ext>
+            </a:extLst>
+          </p:cNvPr>
+          <p:cNvSpPr/>
+          <p:nvPr/>
+        </p:nvSpPr>
+        <p:spPr>
+          <a:xfrm>
+            <a:off x="5029200" y="3266661"/>
+            <a:ext cx="914400" cy="914400"/>
+          </a:xfrm>
+          <a:prstGeom prst="ellipse">
+            <a:avLst/>
+          </a:prstGeom>
+          <a:noFill/>
+          <a:ln>
+            <a:solidFill>
+              <a:srgbClr val="C00000"/>
+            </a:solidFill>
+          </a:ln>
+        </p:spPr>
+        <p:style>
+          <a:lnRef idx="2">
+            <a:schemeClr val="accent1">
+              <a:shade val="15000"/>
+            </a:schemeClr>
+          </a:lnRef>
+          <a:fillRef idx="1">
+            <a:schemeClr val="accent1"/>
+          </a:fillRef>
+          <a:effectRef idx="0">
+            <a:schemeClr val="accent1"/>
+          </a:effectRef>
+          <a:fontRef idx="minor">
+            <a:schemeClr val="lt1"/>
+          </a:fontRef>
+        </p:style>
+        <p:txBody>
+          <a:bodyPr rtlCol="0" anchor="ctr"/>
+          <a:lstStyle/>
+          <a:p>
+            <a:pPr algn="ctr"/>
+            <a:endParaRPr lang="en-CA"/>
+          </a:p>
+        </p:txBody>
+      </p:sp>
+      <p:sp>
+        <p:nvSpPr>
+          <p:cNvPr id="9" name="TextBox 8">
+            <a:extLst>
+              <a:ext uri="{FF2B5EF4-FFF2-40B4-BE49-F238E27FC236}">
+                <a16:creationId xmlns:a16="http://schemas.microsoft.com/office/drawing/2014/main" id="{90A50066-2ECB-EBC7-4265-AADD66E82B68}"/>
+              </a:ext>
+            </a:extLst>
+          </p:cNvPr>
+          <p:cNvSpPr txBox="1"/>
+          <p:nvPr/>
+        </p:nvSpPr>
+        <p:spPr>
+          <a:xfrm>
+            <a:off x="3332922" y="4638261"/>
+            <a:ext cx="1779461" cy="369332"/>
+          </a:xfrm>
+          <a:prstGeom prst="rect">
+            <a:avLst/>
+          </a:prstGeom>
+          <a:noFill/>
+        </p:spPr>
+        <p:txBody>
+          <a:bodyPr wrap="none" rtlCol="0">
+            <a:spAutoFit/>
+          </a:bodyPr>
+          <a:lstStyle/>
+          <a:p>
+            <a:r>
+              <a:rPr lang="en-US" dirty="0"/>
+              <a:t>Miss recognized</a:t>
+            </a:r>
+            <a:endParaRPr lang="en-CA" dirty="0"/>
+          </a:p>
+        </p:txBody>
+      </p:sp>
+      <p:sp>
+        <p:nvSpPr>
+          <p:cNvPr id="10" name="Oval 9">
+            <a:extLst>
+              <a:ext uri="{FF2B5EF4-FFF2-40B4-BE49-F238E27FC236}">
+                <a16:creationId xmlns:a16="http://schemas.microsoft.com/office/drawing/2014/main" id="{BECE88CC-B0A4-989C-DCA8-86804E3EE0EF}"/>
+              </a:ext>
+            </a:extLst>
+          </p:cNvPr>
+          <p:cNvSpPr/>
+          <p:nvPr/>
+        </p:nvSpPr>
+        <p:spPr>
+          <a:xfrm>
+            <a:off x="6858000" y="3723861"/>
+            <a:ext cx="3657600" cy="914400"/>
+          </a:xfrm>
+          <a:prstGeom prst="ellipse">
+            <a:avLst/>
+          </a:prstGeom>
+          <a:noFill/>
+          <a:ln>
+            <a:solidFill>
+              <a:srgbClr val="C00000"/>
+            </a:solidFill>
+          </a:ln>
+        </p:spPr>
+        <p:style>
+          <a:lnRef idx="2">
+            <a:schemeClr val="accent1">
+              <a:shade val="15000"/>
+            </a:schemeClr>
+          </a:lnRef>
+          <a:fillRef idx="1">
+            <a:schemeClr val="accent1"/>
+          </a:fillRef>
+          <a:effectRef idx="0">
+            <a:schemeClr val="accent1"/>
+          </a:effectRef>
+          <a:fontRef idx="minor">
+            <a:schemeClr val="lt1"/>
+          </a:fontRef>
+        </p:style>
+        <p:txBody>
+          <a:bodyPr rtlCol="0" anchor="ctr"/>
+          <a:lstStyle/>
+          <a:p>
+            <a:pPr algn="ctr"/>
+            <a:endParaRPr lang="en-CA"/>
+          </a:p>
+        </p:txBody>
+      </p:sp>
+      <p:sp>
+        <p:nvSpPr>
+          <p:cNvPr id="11" name="TextBox 10">
+            <a:extLst>
+              <a:ext uri="{FF2B5EF4-FFF2-40B4-BE49-F238E27FC236}">
+                <a16:creationId xmlns:a16="http://schemas.microsoft.com/office/drawing/2014/main" id="{B0394704-215A-78C5-839C-98D97B7B64CC}"/>
+              </a:ext>
+            </a:extLst>
+          </p:cNvPr>
+          <p:cNvSpPr txBox="1"/>
+          <p:nvPr/>
+        </p:nvSpPr>
+        <p:spPr>
+          <a:xfrm>
+            <a:off x="3332922" y="4976926"/>
+            <a:ext cx="3328540" cy="369332"/>
+          </a:xfrm>
+          <a:prstGeom prst="rect">
+            <a:avLst/>
+          </a:prstGeom>
+          <a:noFill/>
+        </p:spPr>
+        <p:txBody>
+          <a:bodyPr wrap="none" rtlCol="0">
+            <a:spAutoFit/>
+          </a:bodyPr>
+          <a:lstStyle/>
+          <a:p>
+            <a:r>
+              <a:rPr lang="en-US" dirty="0"/>
+              <a:t>Test state machine updates TLB</a:t>
+            </a:r>
+            <a:endParaRPr lang="en-CA" dirty="0"/>
+          </a:p>
+        </p:txBody>
+      </p:sp>
+      <p:sp>
+        <p:nvSpPr>
+          <p:cNvPr id="12" name="Oval 11">
+            <a:extLst>
+              <a:ext uri="{FF2B5EF4-FFF2-40B4-BE49-F238E27FC236}">
+                <a16:creationId xmlns:a16="http://schemas.microsoft.com/office/drawing/2014/main" id="{90962FC6-A9AC-7BC3-995F-DC8FC38DC85F}"/>
+              </a:ext>
+            </a:extLst>
+          </p:cNvPr>
+          <p:cNvSpPr/>
+          <p:nvPr/>
+        </p:nvSpPr>
+        <p:spPr>
+          <a:xfrm>
+            <a:off x="10614991" y="2160104"/>
+            <a:ext cx="914400" cy="1669774"/>
+          </a:xfrm>
+          <a:prstGeom prst="ellipse">
+            <a:avLst/>
+          </a:prstGeom>
+          <a:noFill/>
+          <a:ln>
+            <a:solidFill>
+              <a:srgbClr val="C00000"/>
+            </a:solidFill>
+          </a:ln>
+        </p:spPr>
+        <p:style>
+          <a:lnRef idx="2">
+            <a:schemeClr val="accent1">
+              <a:shade val="15000"/>
+            </a:schemeClr>
+          </a:lnRef>
+          <a:fillRef idx="1">
+            <a:schemeClr val="accent1"/>
+          </a:fillRef>
+          <a:effectRef idx="0">
+            <a:schemeClr val="accent1"/>
+          </a:effectRef>
+          <a:fontRef idx="minor">
+            <a:schemeClr val="lt1"/>
+          </a:fontRef>
+        </p:style>
+        <p:txBody>
+          <a:bodyPr rtlCol="0" anchor="ctr"/>
+          <a:lstStyle/>
+          <a:p>
+            <a:pPr algn="ctr"/>
+            <a:endParaRPr lang="en-CA"/>
+          </a:p>
+        </p:txBody>
+      </p:sp>
+      <p:sp>
+        <p:nvSpPr>
+          <p:cNvPr id="13" name="TextBox 12">
+            <a:extLst>
+              <a:ext uri="{FF2B5EF4-FFF2-40B4-BE49-F238E27FC236}">
+                <a16:creationId xmlns:a16="http://schemas.microsoft.com/office/drawing/2014/main" id="{FB2B7443-0E73-A06E-8A5F-4CF464108D37}"/>
+              </a:ext>
+            </a:extLst>
+          </p:cNvPr>
+          <p:cNvSpPr txBox="1"/>
+          <p:nvPr/>
+        </p:nvSpPr>
+        <p:spPr>
+          <a:xfrm>
+            <a:off x="10229268" y="4853334"/>
+            <a:ext cx="1798056" cy="369332"/>
+          </a:xfrm>
+          <a:prstGeom prst="rect">
+            <a:avLst/>
+          </a:prstGeom>
+          <a:noFill/>
+        </p:spPr>
+        <p:txBody>
+          <a:bodyPr wrap="none" rtlCol="0">
+            <a:spAutoFit/>
+          </a:bodyPr>
+          <a:lstStyle/>
+          <a:p>
+            <a:r>
+              <a:rPr lang="en-US" dirty="0"/>
+              <a:t>Translation valid</a:t>
+            </a:r>
+            <a:endParaRPr lang="en-CA" dirty="0"/>
+          </a:p>
+        </p:txBody>
+      </p:sp>
+      <p:cxnSp>
+        <p:nvCxnSpPr>
+          <p:cNvPr id="15" name="Straight Arrow Connector 14">
+            <a:extLst>
+              <a:ext uri="{FF2B5EF4-FFF2-40B4-BE49-F238E27FC236}">
+                <a16:creationId xmlns:a16="http://schemas.microsoft.com/office/drawing/2014/main" id="{41FD806B-9409-064A-4754-64A0B1A89AF7}"/>
+              </a:ext>
+            </a:extLst>
+          </p:cNvPr>
+          <p:cNvCxnSpPr>
+            <a:stCxn id="13" idx="0"/>
+          </p:cNvCxnSpPr>
+          <p:nvPr/>
+        </p:nvCxnSpPr>
+        <p:spPr>
+          <a:xfrm flipH="1" flipV="1">
+            <a:off x="11072191" y="3829878"/>
+            <a:ext cx="56105" cy="1023456"/>
+          </a:xfrm>
+          <a:prstGeom prst="straightConnector1">
+            <a:avLst/>
+          </a:prstGeom>
+          <a:ln>
+            <a:solidFill>
+              <a:srgbClr val="C00000"/>
+            </a:solidFill>
+            <a:tailEnd type="triangle"/>
+          </a:ln>
+        </p:spPr>
+        <p:style>
+          <a:lnRef idx="2">
+            <a:schemeClr val="accent1"/>
+          </a:lnRef>
+          <a:fillRef idx="0">
+            <a:schemeClr val="accent1"/>
+          </a:fillRef>
+          <a:effectRef idx="1">
+            <a:schemeClr val="accent1"/>
+          </a:effectRef>
+          <a:fontRef idx="minor">
+            <a:schemeClr val="tx1"/>
+          </a:fontRef>
+        </p:style>
+      </p:cxnSp>
+      <p:cxnSp>
+        <p:nvCxnSpPr>
+          <p:cNvPr id="17" name="Straight Arrow Connector 16">
+            <a:extLst>
+              <a:ext uri="{FF2B5EF4-FFF2-40B4-BE49-F238E27FC236}">
+                <a16:creationId xmlns:a16="http://schemas.microsoft.com/office/drawing/2014/main" id="{B2AA58E9-BB43-E682-C195-65974ABB04AF}"/>
+              </a:ext>
+            </a:extLst>
+          </p:cNvPr>
+          <p:cNvCxnSpPr/>
+          <p:nvPr/>
+        </p:nvCxnSpPr>
+        <p:spPr>
+          <a:xfrm flipV="1">
+            <a:off x="6858000" y="4638261"/>
+            <a:ext cx="901148" cy="399739"/>
+          </a:xfrm>
+          <a:prstGeom prst="straightConnector1">
+            <a:avLst/>
+          </a:prstGeom>
+          <a:ln>
+            <a:solidFill>
+              <a:srgbClr val="C00000"/>
+            </a:solidFill>
+            <a:tailEnd type="triangle"/>
+          </a:ln>
+        </p:spPr>
+        <p:style>
+          <a:lnRef idx="2">
+            <a:schemeClr val="accent1"/>
+          </a:lnRef>
+          <a:fillRef idx="0">
+            <a:schemeClr val="accent1"/>
+          </a:fillRef>
+          <a:effectRef idx="1">
+            <a:schemeClr val="accent1"/>
+          </a:effectRef>
+          <a:fontRef idx="minor">
+            <a:schemeClr val="tx1"/>
+          </a:fontRef>
+        </p:style>
+      </p:cxnSp>
+      <p:cxnSp>
+        <p:nvCxnSpPr>
+          <p:cNvPr id="19" name="Straight Arrow Connector 18">
+            <a:extLst>
+              <a:ext uri="{FF2B5EF4-FFF2-40B4-BE49-F238E27FC236}">
+                <a16:creationId xmlns:a16="http://schemas.microsoft.com/office/drawing/2014/main" id="{465ED996-9679-8242-E0DF-773D201A6ACE}"/>
+              </a:ext>
+            </a:extLst>
+          </p:cNvPr>
+          <p:cNvCxnSpPr/>
+          <p:nvPr/>
+        </p:nvCxnSpPr>
+        <p:spPr>
+          <a:xfrm flipV="1">
+            <a:off x="5257800" y="4253948"/>
+            <a:ext cx="149087" cy="384313"/>
+          </a:xfrm>
+          <a:prstGeom prst="straightConnector1">
+            <a:avLst/>
+          </a:prstGeom>
+          <a:ln>
+            <a:solidFill>
+              <a:srgbClr val="C00000"/>
+            </a:solidFill>
+            <a:tailEnd type="triangle"/>
+          </a:ln>
+        </p:spPr>
+        <p:style>
+          <a:lnRef idx="2">
+            <a:schemeClr val="accent1"/>
+          </a:lnRef>
+          <a:fillRef idx="0">
+            <a:schemeClr val="accent1"/>
+          </a:fillRef>
+          <a:effectRef idx="1">
+            <a:schemeClr val="accent1"/>
+          </a:effectRef>
+          <a:fontRef idx="minor">
+            <a:schemeClr val="tx1"/>
+          </a:fontRef>
+        </p:style>
+      </p:cxnSp>
+    </p:spTree>
+    <p:extLst>
+      <p:ext uri="{BB962C8B-B14F-4D97-AF65-F5344CB8AC3E}">
+        <p14:creationId xmlns:p14="http://schemas.microsoft.com/office/powerpoint/2010/main" val="298200720"/>
       </p:ext>
     </p:extLst>
   </p:cSld>

</xml_diff>